<commit_message>
- minor fixes to presentation - added yml contents to notebook
</commit_message>
<xml_diff>
--- a/Project_Presentation.pptx
+++ b/Project_Presentation.pptx
@@ -222,7 +222,7 @@
           <a:p>
             <a:fld id="{EAE7D5BA-E27E-417C-B51E-848E20D126D3}" type="datetimeFigureOut">
               <a:rPr lang="en-US" smtClean="0"/>
-              <a:t>4/5/2020</a:t>
+              <a:t>4/6/2020</a:t>
             </a:fld>
             <a:endParaRPr lang="en-US"/>
           </a:p>
@@ -744,7 +744,7 @@
           <a:p>
             <a:fld id="{48A87A34-81AB-432B-8DAE-1953F412C126}" type="datetimeFigureOut">
               <a:rPr lang="en-US" dirty="0"/>
-              <a:t>4/5/2020</a:t>
+              <a:t>4/6/2020</a:t>
             </a:fld>
             <a:endParaRPr lang="en-US" dirty="0"/>
           </a:p>
@@ -1051,7 +1051,7 @@
           <a:p>
             <a:fld id="{48A87A34-81AB-432B-8DAE-1953F412C126}" type="datetimeFigureOut">
               <a:rPr lang="en-US" dirty="0"/>
-              <a:t>4/5/2020</a:t>
+              <a:t>4/6/2020</a:t>
             </a:fld>
             <a:endParaRPr lang="en-US" dirty="0"/>
           </a:p>
@@ -1268,7 +1268,7 @@
           <a:p>
             <a:fld id="{48A87A34-81AB-432B-8DAE-1953F412C126}" type="datetimeFigureOut">
               <a:rPr lang="en-US" dirty="0"/>
-              <a:t>4/5/2020</a:t>
+              <a:t>4/6/2020</a:t>
             </a:fld>
             <a:endParaRPr lang="en-US" dirty="0"/>
           </a:p>
@@ -1554,7 +1554,7 @@
           <a:p>
             <a:fld id="{48A87A34-81AB-432B-8DAE-1953F412C126}" type="datetimeFigureOut">
               <a:rPr lang="en-US" dirty="0"/>
-              <a:t>4/5/2020</a:t>
+              <a:t>4/6/2020</a:t>
             </a:fld>
             <a:endParaRPr lang="en-US" dirty="0"/>
           </a:p>
@@ -2003,7 +2003,7 @@
           <a:p>
             <a:fld id="{48A87A34-81AB-432B-8DAE-1953F412C126}" type="datetimeFigureOut">
               <a:rPr lang="en-US" dirty="0"/>
-              <a:t>4/5/2020</a:t>
+              <a:t>4/6/2020</a:t>
             </a:fld>
             <a:endParaRPr lang="en-US" dirty="0"/>
           </a:p>
@@ -2574,7 +2574,7 @@
           <a:p>
             <a:fld id="{48A87A34-81AB-432B-8DAE-1953F412C126}" type="datetimeFigureOut">
               <a:rPr lang="en-US" dirty="0"/>
-              <a:t>4/5/2020</a:t>
+              <a:t>4/6/2020</a:t>
             </a:fld>
             <a:endParaRPr lang="en-US" dirty="0"/>
           </a:p>
@@ -3421,7 +3421,7 @@
           <a:p>
             <a:fld id="{48A87A34-81AB-432B-8DAE-1953F412C126}" type="datetimeFigureOut">
               <a:rPr lang="en-US" dirty="0"/>
-              <a:t>4/5/2020</a:t>
+              <a:t>4/6/2020</a:t>
             </a:fld>
             <a:endParaRPr lang="en-US" dirty="0"/>
           </a:p>
@@ -3621,7 +3621,7 @@
           <a:p>
             <a:fld id="{48A87A34-81AB-432B-8DAE-1953F412C126}" type="datetimeFigureOut">
               <a:rPr lang="en-US" dirty="0"/>
-              <a:t>4/5/2020</a:t>
+              <a:t>4/6/2020</a:t>
             </a:fld>
             <a:endParaRPr lang="en-US" dirty="0"/>
           </a:p>
@@ -3830,7 +3830,7 @@
           <a:p>
             <a:fld id="{48A87A34-81AB-432B-8DAE-1953F412C126}" type="datetimeFigureOut">
               <a:rPr lang="en-US" dirty="0"/>
-              <a:t>4/5/2020</a:t>
+              <a:t>4/6/2020</a:t>
             </a:fld>
             <a:endParaRPr lang="en-US" dirty="0"/>
           </a:p>
@@ -4030,7 +4030,7 @@
           <a:p>
             <a:fld id="{48A87A34-81AB-432B-8DAE-1953F412C126}" type="datetimeFigureOut">
               <a:rPr lang="en-US" dirty="0"/>
-              <a:t>4/5/2020</a:t>
+              <a:t>4/6/2020</a:t>
             </a:fld>
             <a:endParaRPr lang="en-US" dirty="0"/>
           </a:p>
@@ -4305,7 +4305,7 @@
           <a:p>
             <a:fld id="{48A87A34-81AB-432B-8DAE-1953F412C126}" type="datetimeFigureOut">
               <a:rPr lang="en-US" dirty="0"/>
-              <a:t>4/5/2020</a:t>
+              <a:t>4/6/2020</a:t>
             </a:fld>
             <a:endParaRPr lang="en-US" dirty="0"/>
           </a:p>
@@ -4567,7 +4567,7 @@
           <a:p>
             <a:fld id="{48A87A34-81AB-432B-8DAE-1953F412C126}" type="datetimeFigureOut">
               <a:rPr lang="en-US" dirty="0"/>
-              <a:t>4/5/2020</a:t>
+              <a:t>4/6/2020</a:t>
             </a:fld>
             <a:endParaRPr lang="en-US" dirty="0"/>
           </a:p>
@@ -4977,7 +4977,7 @@
           <a:p>
             <a:fld id="{48A87A34-81AB-432B-8DAE-1953F412C126}" type="datetimeFigureOut">
               <a:rPr lang="en-US" dirty="0"/>
-              <a:t>4/5/2020</a:t>
+              <a:t>4/6/2020</a:t>
             </a:fld>
             <a:endParaRPr lang="en-US" dirty="0"/>
           </a:p>
@@ -5120,7 +5120,7 @@
           <a:p>
             <a:fld id="{48A87A34-81AB-432B-8DAE-1953F412C126}" type="datetimeFigureOut">
               <a:rPr lang="en-US" dirty="0"/>
-              <a:t>4/5/2020</a:t>
+              <a:t>4/6/2020</a:t>
             </a:fld>
             <a:endParaRPr lang="en-US" dirty="0"/>
           </a:p>
@@ -5240,7 +5240,7 @@
           <a:p>
             <a:fld id="{48A87A34-81AB-432B-8DAE-1953F412C126}" type="datetimeFigureOut">
               <a:rPr lang="en-US" dirty="0"/>
-              <a:t>4/5/2020</a:t>
+              <a:t>4/6/2020</a:t>
             </a:fld>
             <a:endParaRPr lang="en-US" dirty="0"/>
           </a:p>
@@ -5514,7 +5514,7 @@
           <a:p>
             <a:fld id="{48A87A34-81AB-432B-8DAE-1953F412C126}" type="datetimeFigureOut">
               <a:rPr lang="en-US" dirty="0"/>
-              <a:t>4/5/2020</a:t>
+              <a:t>4/6/2020</a:t>
             </a:fld>
             <a:endParaRPr lang="en-US" dirty="0"/>
           </a:p>
@@ -5821,7 +5821,7 @@
           <a:p>
             <a:fld id="{48A87A34-81AB-432B-8DAE-1953F412C126}" type="datetimeFigureOut">
               <a:rPr lang="en-US" dirty="0"/>
-              <a:t>4/5/2020</a:t>
+              <a:t>4/6/2020</a:t>
             </a:fld>
             <a:endParaRPr lang="en-US" dirty="0"/>
           </a:p>
@@ -6070,7 +6070,7 @@
             <a:fld id="{48A87A34-81AB-432B-8DAE-1953F412C126}" type="datetimeFigureOut">
               <a:rPr lang="en-US" dirty="0"/>
               <a:pPr/>
-              <a:t>4/5/2020</a:t>
+              <a:t>4/6/2020</a:t>
             </a:fld>
             <a:endParaRPr lang="en-US" dirty="0"/>
           </a:p>
@@ -17770,6 +17770,9 @@
           </a:lstStyle>
           <a:p>
             <a:pPr marL="342900" indent="-342900">
+              <a:spcBef>
+                <a:spcPts val="600"/>
+              </a:spcBef>
               <a:buClr>
                 <a:schemeClr val="tx2"/>
               </a:buClr>
@@ -17782,11 +17785,22 @@
                   <a:schemeClr val="tx2"/>
                 </a:solidFill>
               </a:rPr>
-              <a:t> This framework is a collection of model pipelines generated in combinatorial fashion. </a:t>
+              <a:t> </a:t>
+            </a:r>
+            <a:r>
+              <a:rPr lang="en-IN" sz="1800" cap="none" dirty="0">
+                <a:solidFill>
+                  <a:schemeClr val="tx2"/>
+                </a:solidFill>
+              </a:rPr>
+              <a:t>This framework is a collection of model pipelines generated in combinatorial fashion. </a:t>
             </a:r>
           </a:p>
           <a:p>
             <a:pPr marL="342900" indent="-342900">
+              <a:spcBef>
+                <a:spcPts val="600"/>
+              </a:spcBef>
               <a:buClr>
                 <a:schemeClr val="tx2"/>
               </a:buClr>
@@ -17794,7 +17808,7 @@
               <a:buChar char="q"/>
             </a:pPr>
             <a:r>
-              <a:rPr lang="en-IN" cap="none" dirty="0">
+              <a:rPr lang="en-IN" sz="1800" cap="none" dirty="0">
                 <a:solidFill>
                   <a:schemeClr val="tx2"/>
                 </a:solidFill>
@@ -17802,7 +17816,7 @@
               <a:t>Given a dataset (X, y) this validates 120 different model pipelines and stores their results. This also uses </a:t>
             </a:r>
             <a:r>
-              <a:rPr lang="en-IN" cap="none" dirty="0" err="1">
+              <a:rPr lang="en-IN" sz="1800" cap="none" dirty="0" err="1">
                 <a:solidFill>
                   <a:schemeClr val="tx2"/>
                 </a:solidFill>
@@ -17810,7 +17824,7 @@
               <a:t>GridsearchCV</a:t>
             </a:r>
             <a:r>
-              <a:rPr lang="en-IN" cap="none" dirty="0">
+              <a:rPr lang="en-IN" sz="1800" cap="none" dirty="0">
                 <a:solidFill>
                   <a:schemeClr val="tx2"/>
                 </a:solidFill>
@@ -17818,7 +17832,7 @@
               <a:t> used for </a:t>
             </a:r>
             <a:r>
-              <a:rPr lang="en-IN" cap="none" dirty="0" err="1">
+              <a:rPr lang="en-IN" sz="1800" cap="none" dirty="0" err="1">
                 <a:solidFill>
                   <a:schemeClr val="tx2"/>
                 </a:solidFill>
@@ -17826,16 +17840,35 @@
               <a:t>hyperparams</a:t>
             </a:r>
             <a:r>
-              <a:rPr lang="en-IN" cap="none" dirty="0">
+              <a:rPr lang="en-IN" sz="1800" cap="none" dirty="0">
                 <a:solidFill>
                   <a:schemeClr val="tx2"/>
                 </a:solidFill>
               </a:rPr>
-              <a:t> search for each pipeline</a:t>
+              <a:t> search for each pipeline. Models to be generated can be controlled via experiment </a:t>
+            </a:r>
+            <a:r>
+              <a:rPr lang="en-IN" sz="1800" cap="none" dirty="0" err="1">
+                <a:solidFill>
+                  <a:schemeClr val="tx2"/>
+                </a:solidFill>
+              </a:rPr>
+              <a:t>yml</a:t>
+            </a:r>
+            <a:r>
+              <a:rPr lang="en-IN" sz="1800" cap="none" dirty="0">
+                <a:solidFill>
+                  <a:schemeClr val="tx2"/>
+                </a:solidFill>
+              </a:rPr>
+              <a:t> file</a:t>
             </a:r>
           </a:p>
           <a:p>
             <a:pPr marL="342900" indent="-342900">
+              <a:spcBef>
+                <a:spcPts val="600"/>
+              </a:spcBef>
               <a:buClr>
                 <a:schemeClr val="tx2"/>
               </a:buClr>
@@ -17843,12 +17876,20 @@
               <a:buChar char="q"/>
             </a:pPr>
             <a:r>
+              <a:rPr lang="en-IN" sz="1800" cap="none" dirty="0">
+                <a:solidFill>
+                  <a:schemeClr val="tx2"/>
+                </a:solidFill>
+              </a:rPr>
+              <a:t>Generates following pipelines</a:t>
+            </a:r>
+            <a:r>
               <a:rPr lang="en-IN" cap="none" dirty="0">
                 <a:solidFill>
                   <a:schemeClr val="tx2"/>
                 </a:solidFill>
               </a:rPr>
-              <a:t>generates following pipelines</a:t>
+              <a:t> </a:t>
             </a:r>
           </a:p>
           <a:p>

</xml_diff>